<commit_message>
committing 11 Modeling REGRESSION ALGOS
</commit_message>
<xml_diff>
--- a/RACE CAPSTONE PROJECT1/MBA_THIRD TRIMESTER_Capstone Project Abstract.pptx
+++ b/RACE CAPSTONE PROJECT1/MBA_THIRD TRIMESTER_Capstone Project Abstract.pptx
@@ -6786,56 +6786,28 @@
           <a:p>
             <a:r>
               <a:rPr lang="en-US" sz="1600" b="1" dirty="0" smtClean="0"/>
-              <a:t>We will Build several </a:t>
-            </a:r>
-            <a:r>
-              <a:rPr lang="en-US" sz="1600" b="1" smtClean="0"/>
-              <a:t>appropriate </a:t>
-            </a:r>
-            <a:r>
-              <a:rPr lang="en-US" sz="1600" b="1" smtClean="0"/>
-              <a:t>Regression </a:t>
-            </a:r>
+              <a:t>We will Build several appropriate Regression Modeling algorithms namely _OLS,_LASSO,CVLASSO, accordingly to draw further inferences.</a:t>
+            </a:r>
+          </a:p>
+          <a:p>
+            <a:endParaRPr lang="en-US" sz="1600" dirty="0" smtClean="0"/>
+          </a:p>
+          <a:p>
             <a:r>
               <a:rPr lang="en-US" sz="1600" b="1" dirty="0" smtClean="0"/>
-              <a:t>Modeling algorithms namely _OLS,_LASSO,CVLASSO</a:t>
-            </a:r>
-            <a:r>
-              <a:rPr lang="en-US" sz="1600" b="1" dirty="0" smtClean="0"/>
-              <a:t>,</a:t>
+              <a:t>we will also Build Models using K-Nearest Neighbors ,Decision Tress, Random forest and GridSearchCV </a:t>
             </a:r>
             <a:r>
               <a:rPr lang="en-US" sz="1600" b="1" dirty="0" smtClean="0"/>
               <a:t> </a:t>
             </a:r>
             <a:r>
+              <a:rPr lang="en-US" sz="1600" b="1" smtClean="0"/>
+              <a:t>and XGBoost Algorithms</a:t>
+            </a:r>
+            <a:r>
               <a:rPr lang="en-US" sz="1600" b="1" dirty="0" smtClean="0"/>
-              <a:t>accordingly </a:t>
-            </a:r>
-            <a:r>
-              <a:rPr lang="en-US" sz="1600" b="1" dirty="0" smtClean="0"/>
-              <a:t>to draw further inferences.</a:t>
-            </a:r>
-          </a:p>
-          <a:p>
-            <a:endParaRPr lang="en-US" sz="1600" dirty="0" smtClean="0"/>
-          </a:p>
-          <a:p>
-            <a:r>
-              <a:rPr lang="en-US" sz="1600" b="1" dirty="0" smtClean="0"/>
-              <a:t>we will also Build Models using </a:t>
-            </a:r>
-            <a:r>
-              <a:rPr lang="en-US" sz="1600" b="1" dirty="0" smtClean="0"/>
-              <a:t>K-Nearest Neighbors </a:t>
-            </a:r>
-            <a:r>
-              <a:rPr lang="en-US" sz="1600" b="1" dirty="0" smtClean="0"/>
-              <a:t>,Decision </a:t>
-            </a:r>
-            <a:r>
-              <a:rPr lang="en-US" sz="1600" b="1" dirty="0" smtClean="0"/>
-              <a:t>Tress, Random forest and GridSearchCV Algorithms. </a:t>
+              <a:t>. </a:t>
             </a:r>
           </a:p>
           <a:p>
@@ -7063,7 +7035,15 @@
           <a:p>
             <a:r>
               <a:rPr lang="en-US" sz="2000" b="1" dirty="0" smtClean="0"/>
-              <a:t>We shall derive the metrics for each modeling algorithm, including the mean absolute error (MAE), mean square error (MSE), root mean square error (MSE), median absolute error (MAE), and R-square score.</a:t>
+              <a:t>We shall derive the metrics for each modeling algorithm, including the mean absolute error (MAE), mean square error (MSE), root mean square </a:t>
+            </a:r>
+            <a:r>
+              <a:rPr lang="en-US" sz="2000" b="1" smtClean="0"/>
+              <a:t>error (RMSE</a:t>
+            </a:r>
+            <a:r>
+              <a:rPr lang="en-US" sz="2000" b="1" dirty="0" smtClean="0"/>
+              <a:t>), median absolute error (MAE), and R-square score.</a:t>
             </a:r>
           </a:p>
           <a:p>

</xml_diff>